<commit_message>
Added ppt with instructions screenshots
</commit_message>
<xml_diff>
--- a/Assets/StackMeFirst Instructions.pptx
+++ b/Assets/StackMeFirst Instructions.pptx
@@ -274,7 +274,7 @@
           <a:p>
             <a:fld id="{96787614-FB7B-4D9D-9C61-1E0D3795B367}" type="datetimeFigureOut">
               <a:rPr lang="en-US" smtClean="0"/>
-              <a:t>2022-September-18</a:t>
+              <a:t>2022-September-19</a:t>
             </a:fld>
             <a:endParaRPr lang="en-US"/>
           </a:p>
@@ -472,7 +472,7 @@
           <a:p>
             <a:fld id="{96787614-FB7B-4D9D-9C61-1E0D3795B367}" type="datetimeFigureOut">
               <a:rPr lang="en-US" smtClean="0"/>
-              <a:t>2022-September-18</a:t>
+              <a:t>2022-September-19</a:t>
             </a:fld>
             <a:endParaRPr lang="en-US"/>
           </a:p>
@@ -680,7 +680,7 @@
           <a:p>
             <a:fld id="{96787614-FB7B-4D9D-9C61-1E0D3795B367}" type="datetimeFigureOut">
               <a:rPr lang="en-US" smtClean="0"/>
-              <a:t>2022-September-18</a:t>
+              <a:t>2022-September-19</a:t>
             </a:fld>
             <a:endParaRPr lang="en-US"/>
           </a:p>
@@ -878,7 +878,7 @@
           <a:p>
             <a:fld id="{96787614-FB7B-4D9D-9C61-1E0D3795B367}" type="datetimeFigureOut">
               <a:rPr lang="en-US" smtClean="0"/>
-              <a:t>2022-September-18</a:t>
+              <a:t>2022-September-19</a:t>
             </a:fld>
             <a:endParaRPr lang="en-US"/>
           </a:p>
@@ -1153,7 +1153,7 @@
           <a:p>
             <a:fld id="{96787614-FB7B-4D9D-9C61-1E0D3795B367}" type="datetimeFigureOut">
               <a:rPr lang="en-US" smtClean="0"/>
-              <a:t>2022-September-18</a:t>
+              <a:t>2022-September-19</a:t>
             </a:fld>
             <a:endParaRPr lang="en-US"/>
           </a:p>
@@ -1418,7 +1418,7 @@
           <a:p>
             <a:fld id="{96787614-FB7B-4D9D-9C61-1E0D3795B367}" type="datetimeFigureOut">
               <a:rPr lang="en-US" smtClean="0"/>
-              <a:t>2022-September-18</a:t>
+              <a:t>2022-September-19</a:t>
             </a:fld>
             <a:endParaRPr lang="en-US"/>
           </a:p>
@@ -1830,7 +1830,7 @@
           <a:p>
             <a:fld id="{96787614-FB7B-4D9D-9C61-1E0D3795B367}" type="datetimeFigureOut">
               <a:rPr lang="en-US" smtClean="0"/>
-              <a:t>2022-September-18</a:t>
+              <a:t>2022-September-19</a:t>
             </a:fld>
             <a:endParaRPr lang="en-US"/>
           </a:p>
@@ -1971,7 +1971,7 @@
           <a:p>
             <a:fld id="{96787614-FB7B-4D9D-9C61-1E0D3795B367}" type="datetimeFigureOut">
               <a:rPr lang="en-US" smtClean="0"/>
-              <a:t>2022-September-18</a:t>
+              <a:t>2022-September-19</a:t>
             </a:fld>
             <a:endParaRPr lang="en-US"/>
           </a:p>
@@ -2084,7 +2084,7 @@
           <a:p>
             <a:fld id="{96787614-FB7B-4D9D-9C61-1E0D3795B367}" type="datetimeFigureOut">
               <a:rPr lang="en-US" smtClean="0"/>
-              <a:t>2022-September-18</a:t>
+              <a:t>2022-September-19</a:t>
             </a:fld>
             <a:endParaRPr lang="en-US"/>
           </a:p>
@@ -2395,7 +2395,7 @@
           <a:p>
             <a:fld id="{96787614-FB7B-4D9D-9C61-1E0D3795B367}" type="datetimeFigureOut">
               <a:rPr lang="en-US" smtClean="0"/>
-              <a:t>2022-September-18</a:t>
+              <a:t>2022-September-19</a:t>
             </a:fld>
             <a:endParaRPr lang="en-US"/>
           </a:p>
@@ -2683,7 +2683,7 @@
           <a:p>
             <a:fld id="{96787614-FB7B-4D9D-9C61-1E0D3795B367}" type="datetimeFigureOut">
               <a:rPr lang="en-US" smtClean="0"/>
-              <a:t>2022-September-18</a:t>
+              <a:t>2022-September-19</a:t>
             </a:fld>
             <a:endParaRPr lang="en-US"/>
           </a:p>
@@ -2924,7 +2924,7 @@
           <a:p>
             <a:fld id="{96787614-FB7B-4D9D-9C61-1E0D3795B367}" type="datetimeFigureOut">
               <a:rPr lang="en-US" smtClean="0"/>
-              <a:t>2022-September-18</a:t>
+              <a:t>2022-September-19</a:t>
             </a:fld>
             <a:endParaRPr lang="en-US"/>
           </a:p>
@@ -3383,7 +3383,7 @@
                 </a:ext>
               </a:extLst>
             </a:blip>
-            <a:srcRect l="760" r="760"/>
+            <a:srcRect l="2403" r="2403"/>
             <a:stretch/>
           </p:blipFill>
           <p:spPr>
@@ -3419,7 +3419,7 @@
           <p:spPr>
             <a:xfrm>
               <a:off x="761627" y="605191"/>
-              <a:ext cx="3018521" cy="276361"/>
+              <a:ext cx="3125053" cy="228107"/>
             </a:xfrm>
             <a:prstGeom prst="rect">
               <a:avLst/>
@@ -3520,7 +3520,7 @@
           </p:nvSpPr>
           <p:spPr>
             <a:xfrm>
-              <a:off x="2488077" y="4668130"/>
+              <a:off x="2134198" y="4508332"/>
               <a:ext cx="273378" cy="273378"/>
             </a:xfrm>
             <a:prstGeom prst="ellipse">
@@ -3570,7 +3570,7 @@
           </p:nvSpPr>
           <p:spPr>
             <a:xfrm>
-              <a:off x="2358271" y="2053181"/>
+              <a:off x="2577618" y="1773167"/>
               <a:ext cx="273378" cy="273378"/>
             </a:xfrm>
             <a:prstGeom prst="ellipse">
@@ -3620,7 +3620,7 @@
           </p:nvSpPr>
           <p:spPr>
             <a:xfrm>
-              <a:off x="2624766" y="2638152"/>
+              <a:off x="2663540" y="2390020"/>
               <a:ext cx="273378" cy="273378"/>
             </a:xfrm>
             <a:prstGeom prst="ellipse">
@@ -3670,7 +3670,7 @@
           </p:nvSpPr>
           <p:spPr>
             <a:xfrm>
-              <a:off x="3780148" y="1425347"/>
+              <a:off x="3886680" y="1176773"/>
               <a:ext cx="273378" cy="273378"/>
             </a:xfrm>
             <a:prstGeom prst="ellipse">
@@ -3720,7 +3720,7 @@
           </p:nvSpPr>
           <p:spPr>
             <a:xfrm>
-              <a:off x="2898144" y="3922445"/>
+              <a:off x="3385916" y="3413222"/>
               <a:ext cx="273378" cy="273378"/>
             </a:xfrm>
             <a:prstGeom prst="ellipse">
@@ -3770,7 +3770,7 @@
           </p:nvSpPr>
           <p:spPr>
             <a:xfrm>
-              <a:off x="3054284" y="1349785"/>
+              <a:off x="2898144" y="1109819"/>
               <a:ext cx="273378" cy="273378"/>
             </a:xfrm>
             <a:prstGeom prst="ellipse">
@@ -3890,6 +3890,218 @@
           </a:p>
         </p:txBody>
       </p:sp>
+      <p:sp>
+        <p:nvSpPr>
+          <p:cNvPr id="14" name="Oval 13">
+            <a:extLst>
+              <a:ext uri="{FF2B5EF4-FFF2-40B4-BE49-F238E27FC236}">
+                <a16:creationId xmlns:a16="http://schemas.microsoft.com/office/drawing/2014/main" id="{8681380F-6D93-2B68-1D45-531010C98315}"/>
+              </a:ext>
+            </a:extLst>
+          </p:cNvPr>
+          <p:cNvSpPr/>
+          <p:nvPr/>
+        </p:nvSpPr>
+        <p:spPr>
+          <a:xfrm>
+            <a:off x="562564" y="1666430"/>
+            <a:ext cx="182880" cy="182880"/>
+          </a:xfrm>
+          <a:prstGeom prst="ellipse">
+            <a:avLst/>
+          </a:prstGeom>
+          <a:solidFill>
+            <a:srgbClr val="7030A0"/>
+          </a:solidFill>
+        </p:spPr>
+        <p:style>
+          <a:lnRef idx="0">
+            <a:schemeClr val="accent6"/>
+          </a:lnRef>
+          <a:fillRef idx="3">
+            <a:schemeClr val="accent6"/>
+          </a:fillRef>
+          <a:effectRef idx="3">
+            <a:schemeClr val="accent6"/>
+          </a:effectRef>
+          <a:fontRef idx="minor">
+            <a:schemeClr val="lt1"/>
+          </a:fontRef>
+        </p:style>
+        <p:txBody>
+          <a:bodyPr rtlCol="0" anchor="ctr"/>
+          <a:lstStyle/>
+          <a:p>
+            <a:pPr algn="ctr"/>
+            <a:r>
+              <a:rPr lang="en-US" sz="1200" dirty="0">
+                <a:latin typeface="Segoe UI" panose="020B0502040204020203" pitchFamily="34" charset="0"/>
+                <a:cs typeface="Segoe UI" panose="020B0502040204020203" pitchFamily="34" charset="0"/>
+              </a:rPr>
+              <a:t>a</a:t>
+            </a:r>
+          </a:p>
+        </p:txBody>
+      </p:sp>
+      <p:sp>
+        <p:nvSpPr>
+          <p:cNvPr id="17" name="Oval 16">
+            <a:extLst>
+              <a:ext uri="{FF2B5EF4-FFF2-40B4-BE49-F238E27FC236}">
+                <a16:creationId xmlns:a16="http://schemas.microsoft.com/office/drawing/2014/main" id="{626CAD21-FC97-1B25-F390-2B6076E1205A}"/>
+              </a:ext>
+            </a:extLst>
+          </p:cNvPr>
+          <p:cNvSpPr/>
+          <p:nvPr/>
+        </p:nvSpPr>
+        <p:spPr>
+          <a:xfrm>
+            <a:off x="2825558" y="3124231"/>
+            <a:ext cx="182880" cy="182880"/>
+          </a:xfrm>
+          <a:prstGeom prst="ellipse">
+            <a:avLst/>
+          </a:prstGeom>
+          <a:solidFill>
+            <a:srgbClr val="7030A0"/>
+          </a:solidFill>
+        </p:spPr>
+        <p:style>
+          <a:lnRef idx="0">
+            <a:schemeClr val="accent6"/>
+          </a:lnRef>
+          <a:fillRef idx="3">
+            <a:schemeClr val="accent6"/>
+          </a:fillRef>
+          <a:effectRef idx="3">
+            <a:schemeClr val="accent6"/>
+          </a:effectRef>
+          <a:fontRef idx="minor">
+            <a:schemeClr val="lt1"/>
+          </a:fontRef>
+        </p:style>
+        <p:txBody>
+          <a:bodyPr rtlCol="0" anchor="ctr"/>
+          <a:lstStyle/>
+          <a:p>
+            <a:pPr algn="ctr"/>
+            <a:r>
+              <a:rPr lang="en-US" sz="1200" dirty="0">
+                <a:latin typeface="Segoe UI" panose="020B0502040204020203" pitchFamily="34" charset="0"/>
+                <a:cs typeface="Segoe UI" panose="020B0502040204020203" pitchFamily="34" charset="0"/>
+              </a:rPr>
+              <a:t>b</a:t>
+            </a:r>
+          </a:p>
+        </p:txBody>
+      </p:sp>
+      <p:sp>
+        <p:nvSpPr>
+          <p:cNvPr id="18" name="Oval 17">
+            <a:extLst>
+              <a:ext uri="{FF2B5EF4-FFF2-40B4-BE49-F238E27FC236}">
+                <a16:creationId xmlns:a16="http://schemas.microsoft.com/office/drawing/2014/main" id="{DC33F988-8180-DEF2-6E14-743F6549B91F}"/>
+              </a:ext>
+            </a:extLst>
+          </p:cNvPr>
+          <p:cNvSpPr/>
+          <p:nvPr/>
+        </p:nvSpPr>
+        <p:spPr>
+          <a:xfrm>
+            <a:off x="2226136" y="4050199"/>
+            <a:ext cx="182880" cy="182880"/>
+          </a:xfrm>
+          <a:prstGeom prst="ellipse">
+            <a:avLst/>
+          </a:prstGeom>
+          <a:solidFill>
+            <a:srgbClr val="7030A0"/>
+          </a:solidFill>
+        </p:spPr>
+        <p:style>
+          <a:lnRef idx="0">
+            <a:schemeClr val="accent6"/>
+          </a:lnRef>
+          <a:fillRef idx="3">
+            <a:schemeClr val="accent6"/>
+          </a:fillRef>
+          <a:effectRef idx="3">
+            <a:schemeClr val="accent6"/>
+          </a:effectRef>
+          <a:fontRef idx="minor">
+            <a:schemeClr val="lt1"/>
+          </a:fontRef>
+        </p:style>
+        <p:txBody>
+          <a:bodyPr rtlCol="0" anchor="ctr"/>
+          <a:lstStyle/>
+          <a:p>
+            <a:pPr algn="ctr"/>
+            <a:r>
+              <a:rPr lang="en-US" sz="1200" dirty="0">
+                <a:latin typeface="Segoe UI" panose="020B0502040204020203" pitchFamily="34" charset="0"/>
+                <a:cs typeface="Segoe UI" panose="020B0502040204020203" pitchFamily="34" charset="0"/>
+              </a:rPr>
+              <a:t>c</a:t>
+            </a:r>
+          </a:p>
+        </p:txBody>
+      </p:sp>
+      <p:sp>
+        <p:nvSpPr>
+          <p:cNvPr id="19" name="Oval 18">
+            <a:extLst>
+              <a:ext uri="{FF2B5EF4-FFF2-40B4-BE49-F238E27FC236}">
+                <a16:creationId xmlns:a16="http://schemas.microsoft.com/office/drawing/2014/main" id="{675D5C87-244A-8ABD-890F-C89475C24C76}"/>
+              </a:ext>
+            </a:extLst>
+          </p:cNvPr>
+          <p:cNvSpPr/>
+          <p:nvPr/>
+        </p:nvSpPr>
+        <p:spPr>
+          <a:xfrm>
+            <a:off x="2431251" y="4369205"/>
+            <a:ext cx="182880" cy="182880"/>
+          </a:xfrm>
+          <a:prstGeom prst="ellipse">
+            <a:avLst/>
+          </a:prstGeom>
+          <a:solidFill>
+            <a:srgbClr val="7030A0"/>
+          </a:solidFill>
+        </p:spPr>
+        <p:style>
+          <a:lnRef idx="0">
+            <a:schemeClr val="accent6"/>
+          </a:lnRef>
+          <a:fillRef idx="3">
+            <a:schemeClr val="accent6"/>
+          </a:fillRef>
+          <a:effectRef idx="3">
+            <a:schemeClr val="accent6"/>
+          </a:effectRef>
+          <a:fontRef idx="minor">
+            <a:schemeClr val="lt1"/>
+          </a:fontRef>
+        </p:style>
+        <p:txBody>
+          <a:bodyPr rtlCol="0" anchor="ctr"/>
+          <a:lstStyle/>
+          <a:p>
+            <a:pPr algn="ctr"/>
+            <a:r>
+              <a:rPr lang="en-US" sz="1200" dirty="0">
+                <a:latin typeface="Segoe UI" panose="020B0502040204020203" pitchFamily="34" charset="0"/>
+                <a:cs typeface="Segoe UI" panose="020B0502040204020203" pitchFamily="34" charset="0"/>
+              </a:rPr>
+              <a:t>d</a:t>
+            </a:r>
+          </a:p>
+        </p:txBody>
+      </p:sp>
     </p:spTree>
     <p:extLst>
       <p:ext uri="{BB962C8B-B14F-4D97-AF65-F5344CB8AC3E}">
@@ -4093,7 +4305,7 @@
         </p:blipFill>
         <p:spPr>
           <a:xfrm>
-            <a:off x="8513068" y="1970675"/>
+            <a:off x="8548579" y="2395074"/>
             <a:ext cx="3480848" cy="4152900"/>
           </a:xfrm>
           <a:prstGeom prst="rect">
@@ -4267,10 +4479,10 @@
       </p:sp>
       <p:pic>
         <p:nvPicPr>
-          <p:cNvPr id="8" name="Picture 7">
-            <a:extLst>
-              <a:ext uri="{FF2B5EF4-FFF2-40B4-BE49-F238E27FC236}">
-                <a16:creationId xmlns:a16="http://schemas.microsoft.com/office/drawing/2014/main" id="{6EA8838D-6902-AD78-4DA3-BC0C26AFB145}"/>
+          <p:cNvPr id="6" name="Picture 5">
+            <a:extLst>
+              <a:ext uri="{FF2B5EF4-FFF2-40B4-BE49-F238E27FC236}">
+                <a16:creationId xmlns:a16="http://schemas.microsoft.com/office/drawing/2014/main" id="{AA299A72-FB6C-527B-13BE-5A56C1888093}"/>
               </a:ext>
             </a:extLst>
           </p:cNvPr>
@@ -4280,75 +4492,19 @@
           <p:nvPr/>
         </p:nvPicPr>
         <p:blipFill>
-          <a:blip r:embed="rId3">
-            <a:extLst>
-              <a:ext uri="{28A0092B-C50C-407E-A947-70E740481C1C}">
-                <a14:useLocalDpi xmlns:a14="http://schemas.microsoft.com/office/drawing/2010/main" val="0"/>
-              </a:ext>
-            </a:extLst>
-          </a:blip>
-          <a:srcRect/>
-          <a:stretch/>
+          <a:blip r:embed="rId3"/>
+          <a:stretch>
+            <a:fillRect/>
+          </a:stretch>
         </p:blipFill>
         <p:spPr>
           <a:xfrm>
-            <a:off x="7445231" y="700578"/>
-            <a:ext cx="3466667" cy="5626526"/>
+            <a:off x="3906173" y="1857748"/>
+            <a:ext cx="7237057" cy="3870841"/>
           </a:xfrm>
           <a:prstGeom prst="rect">
             <a:avLst/>
           </a:prstGeom>
-          <a:ln>
-            <a:solidFill>
-              <a:schemeClr val="tx1">
-                <a:lumMod val="50000"/>
-                <a:lumOff val="50000"/>
-              </a:schemeClr>
-            </a:solidFill>
-          </a:ln>
-        </p:spPr>
-      </p:pic>
-      <p:pic>
-        <p:nvPicPr>
-          <p:cNvPr id="5" name="Picture 4">
-            <a:extLst>
-              <a:ext uri="{FF2B5EF4-FFF2-40B4-BE49-F238E27FC236}">
-                <a16:creationId xmlns:a16="http://schemas.microsoft.com/office/drawing/2014/main" id="{37B272BD-7BBD-76CC-FDEC-DD830D7F2E7B}"/>
-              </a:ext>
-            </a:extLst>
-          </p:cNvPr>
-          <p:cNvPicPr>
-            <a:picLocks noChangeAspect="1"/>
-          </p:cNvPicPr>
-          <p:nvPr/>
-        </p:nvPicPr>
-        <p:blipFill rotWithShape="1">
-          <a:blip r:embed="rId4">
-            <a:extLst>
-              <a:ext uri="{28A0092B-C50C-407E-A947-70E740481C1C}">
-                <a14:useLocalDpi xmlns:a14="http://schemas.microsoft.com/office/drawing/2010/main" val="0"/>
-              </a:ext>
-            </a:extLst>
-          </a:blip>
-          <a:srcRect r="478"/>
-          <a:stretch/>
-        </p:blipFill>
-        <p:spPr>
-          <a:xfrm>
-            <a:off x="933085" y="1930440"/>
-            <a:ext cx="6934565" cy="4251814"/>
-          </a:xfrm>
-          <a:prstGeom prst="rect">
-            <a:avLst/>
-          </a:prstGeom>
-          <a:ln>
-            <a:solidFill>
-              <a:schemeClr val="tx1">
-                <a:lumMod val="50000"/>
-                <a:lumOff val="50000"/>
-              </a:schemeClr>
-            </a:solidFill>
-          </a:ln>
         </p:spPr>
       </p:pic>
     </p:spTree>
@@ -4381,49 +4537,6 @@
           <a:chExt cx="0" cy="0"/>
         </a:xfrm>
       </p:grpSpPr>
-      <p:pic>
-        <p:nvPicPr>
-          <p:cNvPr id="3" name="Picture 2">
-            <a:extLst>
-              <a:ext uri="{FF2B5EF4-FFF2-40B4-BE49-F238E27FC236}">
-                <a16:creationId xmlns:a16="http://schemas.microsoft.com/office/drawing/2014/main" id="{FFBFB1B5-F81C-1420-CB3F-45C45DA8EE6D}"/>
-              </a:ext>
-            </a:extLst>
-          </p:cNvPr>
-          <p:cNvPicPr>
-            <a:picLocks noChangeAspect="1"/>
-          </p:cNvPicPr>
-          <p:nvPr/>
-        </p:nvPicPr>
-        <p:blipFill rotWithShape="1">
-          <a:blip r:embed="rId2">
-            <a:extLst>
-              <a:ext uri="{28A0092B-C50C-407E-A947-70E740481C1C}">
-                <a14:useLocalDpi xmlns:a14="http://schemas.microsoft.com/office/drawing/2010/main" val="0"/>
-              </a:ext>
-            </a:extLst>
-          </a:blip>
-          <a:srcRect l="323"/>
-          <a:stretch/>
-        </p:blipFill>
-        <p:spPr>
-          <a:xfrm>
-            <a:off x="900113" y="1027255"/>
-            <a:ext cx="4916512" cy="5200586"/>
-          </a:xfrm>
-          <a:prstGeom prst="rect">
-            <a:avLst/>
-          </a:prstGeom>
-          <a:ln>
-            <a:solidFill>
-              <a:schemeClr val="tx1">
-                <a:lumMod val="50000"/>
-                <a:lumOff val="50000"/>
-              </a:schemeClr>
-            </a:solidFill>
-          </a:ln>
-        </p:spPr>
-      </p:pic>
       <p:sp>
         <p:nvSpPr>
           <p:cNvPr id="4" name="TextBox 3">
@@ -4499,7 +4612,7 @@
             </a:r>
             <a:r>
               <a:rPr lang="en-US" sz="1200" dirty="0">
-                <a:hlinkClick r:id="rId3"/>
+                <a:hlinkClick r:id="rId2"/>
               </a:rPr>
               <a:t>https://stackoverflow.com/q/59546370/6908282</a:t>
             </a:r>
@@ -4507,6 +4620,66 @@
           </a:p>
         </p:txBody>
       </p:sp>
+      <p:pic>
+        <p:nvPicPr>
+          <p:cNvPr id="6" name="Picture 5">
+            <a:extLst>
+              <a:ext uri="{FF2B5EF4-FFF2-40B4-BE49-F238E27FC236}">
+                <a16:creationId xmlns:a16="http://schemas.microsoft.com/office/drawing/2014/main" id="{42A143D6-6B16-4D5F-193D-473F949D3DE3}"/>
+              </a:ext>
+            </a:extLst>
+          </p:cNvPr>
+          <p:cNvPicPr>
+            <a:picLocks noChangeAspect="1"/>
+          </p:cNvPicPr>
+          <p:nvPr/>
+        </p:nvPicPr>
+        <p:blipFill>
+          <a:blip r:embed="rId3"/>
+          <a:stretch>
+            <a:fillRect/>
+          </a:stretch>
+        </p:blipFill>
+        <p:spPr>
+          <a:xfrm>
+            <a:off x="4837920" y="801084"/>
+            <a:ext cx="5460178" cy="4430205"/>
+          </a:xfrm>
+          <a:prstGeom prst="rect">
+            <a:avLst/>
+          </a:prstGeom>
+        </p:spPr>
+      </p:pic>
+      <p:pic>
+        <p:nvPicPr>
+          <p:cNvPr id="8" name="Picture 7">
+            <a:extLst>
+              <a:ext uri="{FF2B5EF4-FFF2-40B4-BE49-F238E27FC236}">
+                <a16:creationId xmlns:a16="http://schemas.microsoft.com/office/drawing/2014/main" id="{A0C4570D-AD1B-3A6B-AF72-1339BA8B1C76}"/>
+              </a:ext>
+            </a:extLst>
+          </p:cNvPr>
+          <p:cNvPicPr>
+            <a:picLocks noChangeAspect="1"/>
+          </p:cNvPicPr>
+          <p:nvPr/>
+        </p:nvPicPr>
+        <p:blipFill>
+          <a:blip r:embed="rId4"/>
+          <a:stretch>
+            <a:fillRect/>
+          </a:stretch>
+        </p:blipFill>
+        <p:spPr>
+          <a:xfrm>
+            <a:off x="8082359" y="2340308"/>
+            <a:ext cx="3809524" cy="4438095"/>
+          </a:xfrm>
+          <a:prstGeom prst="rect">
+            <a:avLst/>
+          </a:prstGeom>
+        </p:spPr>
+      </p:pic>
     </p:spTree>
     <p:extLst>
       <p:ext uri="{BB962C8B-B14F-4D97-AF65-F5344CB8AC3E}">
@@ -4552,15 +4725,20 @@
           <p:nvPr/>
         </p:nvPicPr>
         <p:blipFill>
-          <a:blip r:embed="rId2"/>
-          <a:stretch>
-            <a:fillRect/>
-          </a:stretch>
+          <a:blip r:embed="rId2">
+            <a:extLst>
+              <a:ext uri="{28A0092B-C50C-407E-A947-70E740481C1C}">
+                <a14:useLocalDpi xmlns:a14="http://schemas.microsoft.com/office/drawing/2010/main" val="0"/>
+              </a:ext>
+            </a:extLst>
+          </a:blip>
+          <a:srcRect/>
+          <a:stretch/>
         </p:blipFill>
         <p:spPr>
           <a:xfrm>
-            <a:off x="294812" y="675746"/>
-            <a:ext cx="5172706" cy="5046542"/>
+            <a:off x="130572" y="559304"/>
+            <a:ext cx="5172706" cy="4196959"/>
           </a:xfrm>
           <a:prstGeom prst="rect">
             <a:avLst/>
@@ -4648,7 +4826,7 @@
         </p:blipFill>
         <p:spPr>
           <a:xfrm>
-            <a:off x="8620140" y="2130153"/>
+            <a:off x="8711152" y="2433707"/>
             <a:ext cx="3480848" cy="4152900"/>
           </a:xfrm>
           <a:prstGeom prst="rect">
@@ -4691,7 +4869,7 @@
         </p:blipFill>
         <p:spPr>
           <a:xfrm>
-            <a:off x="4318069" y="1458229"/>
+            <a:off x="4329833" y="1170318"/>
             <a:ext cx="4086507" cy="5128378"/>
           </a:xfrm>
           <a:prstGeom prst="rect">
@@ -4701,36 +4879,6 @@
       </p:pic>
       <p:pic>
         <p:nvPicPr>
-          <p:cNvPr id="14" name="Picture 13">
-            <a:extLst>
-              <a:ext uri="{FF2B5EF4-FFF2-40B4-BE49-F238E27FC236}">
-                <a16:creationId xmlns:a16="http://schemas.microsoft.com/office/drawing/2014/main" id="{8845EC3A-51FA-DABD-2D4A-10362FFA6ECB}"/>
-              </a:ext>
-            </a:extLst>
-          </p:cNvPr>
-          <p:cNvPicPr>
-            <a:picLocks noChangeAspect="1"/>
-          </p:cNvPicPr>
-          <p:nvPr/>
-        </p:nvPicPr>
-        <p:blipFill>
-          <a:blip r:embed="rId5"/>
-          <a:stretch>
-            <a:fillRect/>
-          </a:stretch>
-        </p:blipFill>
-        <p:spPr>
-          <a:xfrm>
-            <a:off x="-159268" y="2932275"/>
-            <a:ext cx="7353602" cy="4251814"/>
-          </a:xfrm>
-          <a:prstGeom prst="rect">
-            <a:avLst/>
-          </a:prstGeom>
-        </p:spPr>
-      </p:pic>
-      <p:pic>
-        <p:nvPicPr>
           <p:cNvPr id="3" name="Picture 2">
             <a:extLst>
               <a:ext uri="{FF2B5EF4-FFF2-40B4-BE49-F238E27FC236}">
@@ -4744,8 +4892,14 @@
           <p:nvPr/>
         </p:nvPicPr>
         <p:blipFill rotWithShape="1">
-          <a:blip r:embed="rId6"/>
-          <a:srcRect l="920" r="1246"/>
+          <a:blip r:embed="rId5">
+            <a:extLst>
+              <a:ext uri="{28A0092B-C50C-407E-A947-70E740481C1C}">
+                <a14:useLocalDpi xmlns:a14="http://schemas.microsoft.com/office/drawing/2010/main" val="0"/>
+              </a:ext>
+            </a:extLst>
+          </a:blip>
+          <a:srcRect l="1797" r="1797"/>
           <a:stretch/>
         </p:blipFill>
         <p:spPr>
@@ -4764,6 +4918,66 @@
               </a:schemeClr>
             </a:solidFill>
           </a:ln>
+        </p:spPr>
+      </p:pic>
+      <p:pic>
+        <p:nvPicPr>
+          <p:cNvPr id="6" name="Picture 5">
+            <a:extLst>
+              <a:ext uri="{FF2B5EF4-FFF2-40B4-BE49-F238E27FC236}">
+                <a16:creationId xmlns:a16="http://schemas.microsoft.com/office/drawing/2014/main" id="{3CC548F3-ADEA-DADC-0E76-53C3265380A1}"/>
+              </a:ext>
+            </a:extLst>
+          </p:cNvPr>
+          <p:cNvPicPr>
+            <a:picLocks noChangeAspect="1"/>
+          </p:cNvPicPr>
+          <p:nvPr/>
+        </p:nvPicPr>
+        <p:blipFill>
+          <a:blip r:embed="rId6"/>
+          <a:stretch>
+            <a:fillRect/>
+          </a:stretch>
+        </p:blipFill>
+        <p:spPr>
+          <a:xfrm>
+            <a:off x="390319" y="3263788"/>
+            <a:ext cx="6212457" cy="3322819"/>
+          </a:xfrm>
+          <a:prstGeom prst="rect">
+            <a:avLst/>
+          </a:prstGeom>
+        </p:spPr>
+      </p:pic>
+      <p:pic>
+        <p:nvPicPr>
+          <p:cNvPr id="8" name="Picture 7">
+            <a:extLst>
+              <a:ext uri="{FF2B5EF4-FFF2-40B4-BE49-F238E27FC236}">
+                <a16:creationId xmlns:a16="http://schemas.microsoft.com/office/drawing/2014/main" id="{58451B17-0CA4-0D54-AAD9-893194B3421D}"/>
+              </a:ext>
+            </a:extLst>
+          </p:cNvPr>
+          <p:cNvPicPr>
+            <a:picLocks noChangeAspect="1"/>
+          </p:cNvPicPr>
+          <p:nvPr/>
+        </p:nvPicPr>
+        <p:blipFill>
+          <a:blip r:embed="rId7"/>
+          <a:stretch>
+            <a:fillRect/>
+          </a:stretch>
+        </p:blipFill>
+        <p:spPr>
+          <a:xfrm>
+            <a:off x="4191238" y="1209952"/>
+            <a:ext cx="3809524" cy="4438095"/>
+          </a:xfrm>
+          <a:prstGeom prst="rect">
+            <a:avLst/>
+          </a:prstGeom>
         </p:spPr>
       </p:pic>
     </p:spTree>

</xml_diff>

<commit_message>
updated instructions ppt + readme inline links to refs
</commit_message>
<xml_diff>
--- a/Assets/StackMeFirst Instructions.pptx
+++ b/Assets/StackMeFirst Instructions.pptx
@@ -274,7 +274,7 @@
           <a:p>
             <a:fld id="{96787614-FB7B-4D9D-9C61-1E0D3795B367}" type="datetimeFigureOut">
               <a:rPr lang="en-US" smtClean="0"/>
-              <a:t>2022-September-19</a:t>
+              <a:t>2022-September-20</a:t>
             </a:fld>
             <a:endParaRPr lang="en-US"/>
           </a:p>
@@ -472,7 +472,7 @@
           <a:p>
             <a:fld id="{96787614-FB7B-4D9D-9C61-1E0D3795B367}" type="datetimeFigureOut">
               <a:rPr lang="en-US" smtClean="0"/>
-              <a:t>2022-September-19</a:t>
+              <a:t>2022-September-20</a:t>
             </a:fld>
             <a:endParaRPr lang="en-US"/>
           </a:p>
@@ -680,7 +680,7 @@
           <a:p>
             <a:fld id="{96787614-FB7B-4D9D-9C61-1E0D3795B367}" type="datetimeFigureOut">
               <a:rPr lang="en-US" smtClean="0"/>
-              <a:t>2022-September-19</a:t>
+              <a:t>2022-September-20</a:t>
             </a:fld>
             <a:endParaRPr lang="en-US"/>
           </a:p>
@@ -878,7 +878,7 @@
           <a:p>
             <a:fld id="{96787614-FB7B-4D9D-9C61-1E0D3795B367}" type="datetimeFigureOut">
               <a:rPr lang="en-US" smtClean="0"/>
-              <a:t>2022-September-19</a:t>
+              <a:t>2022-September-20</a:t>
             </a:fld>
             <a:endParaRPr lang="en-US"/>
           </a:p>
@@ -1153,7 +1153,7 @@
           <a:p>
             <a:fld id="{96787614-FB7B-4D9D-9C61-1E0D3795B367}" type="datetimeFigureOut">
               <a:rPr lang="en-US" smtClean="0"/>
-              <a:t>2022-September-19</a:t>
+              <a:t>2022-September-20</a:t>
             </a:fld>
             <a:endParaRPr lang="en-US"/>
           </a:p>
@@ -1418,7 +1418,7 @@
           <a:p>
             <a:fld id="{96787614-FB7B-4D9D-9C61-1E0D3795B367}" type="datetimeFigureOut">
               <a:rPr lang="en-US" smtClean="0"/>
-              <a:t>2022-September-19</a:t>
+              <a:t>2022-September-20</a:t>
             </a:fld>
             <a:endParaRPr lang="en-US"/>
           </a:p>
@@ -1830,7 +1830,7 @@
           <a:p>
             <a:fld id="{96787614-FB7B-4D9D-9C61-1E0D3795B367}" type="datetimeFigureOut">
               <a:rPr lang="en-US" smtClean="0"/>
-              <a:t>2022-September-19</a:t>
+              <a:t>2022-September-20</a:t>
             </a:fld>
             <a:endParaRPr lang="en-US"/>
           </a:p>
@@ -1971,7 +1971,7 @@
           <a:p>
             <a:fld id="{96787614-FB7B-4D9D-9C61-1E0D3795B367}" type="datetimeFigureOut">
               <a:rPr lang="en-US" smtClean="0"/>
-              <a:t>2022-September-19</a:t>
+              <a:t>2022-September-20</a:t>
             </a:fld>
             <a:endParaRPr lang="en-US"/>
           </a:p>
@@ -2084,7 +2084,7 @@
           <a:p>
             <a:fld id="{96787614-FB7B-4D9D-9C61-1E0D3795B367}" type="datetimeFigureOut">
               <a:rPr lang="en-US" smtClean="0"/>
-              <a:t>2022-September-19</a:t>
+              <a:t>2022-September-20</a:t>
             </a:fld>
             <a:endParaRPr lang="en-US"/>
           </a:p>
@@ -2395,7 +2395,7 @@
           <a:p>
             <a:fld id="{96787614-FB7B-4D9D-9C61-1E0D3795B367}" type="datetimeFigureOut">
               <a:rPr lang="en-US" smtClean="0"/>
-              <a:t>2022-September-19</a:t>
+              <a:t>2022-September-20</a:t>
             </a:fld>
             <a:endParaRPr lang="en-US"/>
           </a:p>
@@ -2683,7 +2683,7 @@
           <a:p>
             <a:fld id="{96787614-FB7B-4D9D-9C61-1E0D3795B367}" type="datetimeFigureOut">
               <a:rPr lang="en-US" smtClean="0"/>
-              <a:t>2022-September-19</a:t>
+              <a:t>2022-September-20</a:t>
             </a:fld>
             <a:endParaRPr lang="en-US"/>
           </a:p>
@@ -2924,7 +2924,7 @@
           <a:p>
             <a:fld id="{96787614-FB7B-4D9D-9C61-1E0D3795B367}" type="datetimeFigureOut">
               <a:rPr lang="en-US" smtClean="0"/>
-              <a:t>2022-September-19</a:t>
+              <a:t>2022-September-20</a:t>
             </a:fld>
             <a:endParaRPr lang="en-US"/>
           </a:p>
@@ -3341,12 +3341,95 @@
           <a:chExt cx="0" cy="0"/>
         </a:xfrm>
       </p:grpSpPr>
+      <p:sp>
+        <p:nvSpPr>
+          <p:cNvPr id="15" name="TextBox 14">
+            <a:extLst>
+              <a:ext uri="{FF2B5EF4-FFF2-40B4-BE49-F238E27FC236}">
+                <a16:creationId xmlns:a16="http://schemas.microsoft.com/office/drawing/2014/main" id="{4C379592-850C-C72D-59A2-83433A057A62}"/>
+              </a:ext>
+            </a:extLst>
+          </p:cNvPr>
+          <p:cNvSpPr txBox="1"/>
+          <p:nvPr/>
+        </p:nvSpPr>
+        <p:spPr>
+          <a:xfrm>
+            <a:off x="0" y="79597"/>
+            <a:ext cx="12192000" cy="400110"/>
+          </a:xfrm>
+          <a:prstGeom prst="rect">
+            <a:avLst/>
+          </a:prstGeom>
+          <a:solidFill>
+            <a:schemeClr val="accent1"/>
+          </a:solidFill>
+        </p:spPr>
+        <p:txBody>
+          <a:bodyPr wrap="square" rtlCol="0">
+            <a:spAutoFit/>
+          </a:bodyPr>
+          <a:lstStyle/>
+          <a:p>
+            <a:r>
+              <a:rPr lang="en-US" sz="2000" b="1" dirty="0">
+                <a:solidFill>
+                  <a:schemeClr val="bg1"/>
+                </a:solidFill>
+              </a:rPr>
+              <a:t>Popup Instructions</a:t>
+            </a:r>
+          </a:p>
+        </p:txBody>
+      </p:sp>
+      <p:sp>
+        <p:nvSpPr>
+          <p:cNvPr id="16" name="TextBox 15">
+            <a:extLst>
+              <a:ext uri="{FF2B5EF4-FFF2-40B4-BE49-F238E27FC236}">
+                <a16:creationId xmlns:a16="http://schemas.microsoft.com/office/drawing/2014/main" id="{CEEDB5F6-0F70-8461-9860-3B5E730415DD}"/>
+              </a:ext>
+            </a:extLst>
+          </p:cNvPr>
+          <p:cNvSpPr txBox="1"/>
+          <p:nvPr/>
+        </p:nvSpPr>
+        <p:spPr>
+          <a:xfrm>
+            <a:off x="-21258" y="444558"/>
+            <a:ext cx="4250010" cy="276999"/>
+          </a:xfrm>
+          <a:prstGeom prst="rect">
+            <a:avLst/>
+          </a:prstGeom>
+          <a:noFill/>
+        </p:spPr>
+        <p:txBody>
+          <a:bodyPr wrap="none" rtlCol="0">
+            <a:spAutoFit/>
+          </a:bodyPr>
+          <a:lstStyle/>
+          <a:p>
+            <a:r>
+              <a:rPr lang="en-US" sz="1200" dirty="0"/>
+              <a:t>Reference Link: </a:t>
+            </a:r>
+            <a:r>
+              <a:rPr lang="en-US" sz="1200" dirty="0">
+                <a:hlinkClick r:id="rId2"/>
+              </a:rPr>
+              <a:t>https://stackoverflow.com/q/73591695/6908282</a:t>
+            </a:r>
+            <a:endParaRPr lang="en-US" sz="1200" dirty="0"/>
+          </a:p>
+        </p:txBody>
+      </p:sp>
       <p:grpSp>
         <p:nvGrpSpPr>
-          <p:cNvPr id="10" name="Group 9">
-            <a:extLst>
-              <a:ext uri="{FF2B5EF4-FFF2-40B4-BE49-F238E27FC236}">
-                <a16:creationId xmlns:a16="http://schemas.microsoft.com/office/drawing/2014/main" id="{900B5F50-8465-1320-1CDF-EB911B2B6C76}"/>
+          <p:cNvPr id="21" name="Group 20">
+            <a:extLst>
+              <a:ext uri="{FF2B5EF4-FFF2-40B4-BE49-F238E27FC236}">
+                <a16:creationId xmlns:a16="http://schemas.microsoft.com/office/drawing/2014/main" id="{829587FF-68C8-BAAA-AAE2-329D63A5C5B1}"/>
               </a:ext>
             </a:extLst>
           </p:cNvPr>
@@ -3357,7 +3440,7 @@
           <a:xfrm>
             <a:off x="507103" y="949123"/>
             <a:ext cx="3466667" cy="5644635"/>
-            <a:chOff x="761627" y="590905"/>
+            <a:chOff x="507103" y="949123"/>
             <a:chExt cx="3466667" cy="5644635"/>
           </a:xfrm>
         </p:grpSpPr>
@@ -3376,7 +3459,7 @@
             <p:nvPr/>
           </p:nvPicPr>
           <p:blipFill rotWithShape="1">
-            <a:blip r:embed="rId2">
+            <a:blip r:embed="rId3">
               <a:extLst>
                 <a:ext uri="{28A0092B-C50C-407E-A947-70E740481C1C}">
                   <a14:useLocalDpi xmlns:a14="http://schemas.microsoft.com/office/drawing/2010/main" val="0"/>
@@ -3388,7 +3471,7 @@
           </p:blipFill>
           <p:spPr>
             <a:xfrm>
-              <a:off x="761627" y="590905"/>
+              <a:off x="507103" y="949123"/>
               <a:ext cx="3466667" cy="5644635"/>
             </a:xfrm>
             <a:prstGeom prst="rect">
@@ -3418,7 +3501,7 @@
           </p:nvSpPr>
           <p:spPr>
             <a:xfrm>
-              <a:off x="761627" y="605191"/>
+              <a:off x="507103" y="963409"/>
               <a:ext cx="3125053" cy="228107"/>
             </a:xfrm>
             <a:prstGeom prst="rect">
@@ -3470,7 +3553,7 @@
           </p:nvSpPr>
           <p:spPr>
             <a:xfrm>
-              <a:off x="3327662" y="622460"/>
+              <a:off x="3358778" y="984690"/>
               <a:ext cx="273378" cy="273378"/>
             </a:xfrm>
             <a:prstGeom prst="ellipse">
@@ -3520,7 +3603,7 @@
           </p:nvSpPr>
           <p:spPr>
             <a:xfrm>
-              <a:off x="2134198" y="4508332"/>
+              <a:off x="2693390" y="2131385"/>
               <a:ext cx="273378" cy="273378"/>
             </a:xfrm>
             <a:prstGeom prst="ellipse">
@@ -3570,7 +3653,7 @@
           </p:nvSpPr>
           <p:spPr>
             <a:xfrm>
-              <a:off x="2577618" y="1773167"/>
+              <a:off x="2431251" y="2728015"/>
               <a:ext cx="273378" cy="273378"/>
             </a:xfrm>
             <a:prstGeom prst="ellipse">
@@ -3620,7 +3703,7 @@
           </p:nvSpPr>
           <p:spPr>
             <a:xfrm>
-              <a:off x="2663540" y="2390020"/>
+              <a:off x="2069629" y="4859842"/>
               <a:ext cx="273378" cy="273378"/>
             </a:xfrm>
             <a:prstGeom prst="ellipse">
@@ -3670,57 +3753,7 @@
           </p:nvSpPr>
           <p:spPr>
             <a:xfrm>
-              <a:off x="3886680" y="1176773"/>
-              <a:ext cx="273378" cy="273378"/>
-            </a:xfrm>
-            <a:prstGeom prst="ellipse">
-              <a:avLst/>
-            </a:prstGeom>
-          </p:spPr>
-          <p:style>
-            <a:lnRef idx="0">
-              <a:schemeClr val="accent5"/>
-            </a:lnRef>
-            <a:fillRef idx="3">
-              <a:schemeClr val="accent5"/>
-            </a:fillRef>
-            <a:effectRef idx="3">
-              <a:schemeClr val="accent5"/>
-            </a:effectRef>
-            <a:fontRef idx="minor">
-              <a:schemeClr val="lt1"/>
-            </a:fontRef>
-          </p:style>
-          <p:txBody>
-            <a:bodyPr rtlCol="0" anchor="ctr"/>
-            <a:lstStyle/>
-            <a:p>
-              <a:pPr algn="ctr"/>
-              <a:r>
-                <a:rPr lang="en-US" dirty="0">
-                  <a:latin typeface="Segoe UI" panose="020B0502040204020203" pitchFamily="34" charset="0"/>
-                  <a:cs typeface="Segoe UI" panose="020B0502040204020203" pitchFamily="34" charset="0"/>
-                </a:rPr>
-                <a:t>5</a:t>
-              </a:r>
-            </a:p>
-          </p:txBody>
-        </p:sp>
-        <p:sp>
-          <p:nvSpPr>
-            <p:cNvPr id="9" name="Oval 8">
-              <a:extLst>
-                <a:ext uri="{FF2B5EF4-FFF2-40B4-BE49-F238E27FC236}">
-                  <a16:creationId xmlns:a16="http://schemas.microsoft.com/office/drawing/2014/main" id="{F30ADE69-3BD4-E5CD-D99B-324A40E383DF}"/>
-                </a:ext>
-              </a:extLst>
-            </p:cNvPr>
-            <p:cNvSpPr/>
-            <p:nvPr/>
-          </p:nvSpPr>
-          <p:spPr>
-            <a:xfrm>
-              <a:off x="3385916" y="3413222"/>
+              <a:off x="3632156" y="1534991"/>
               <a:ext cx="273378" cy="273378"/>
             </a:xfrm>
             <a:prstGeom prst="ellipse">
@@ -3758,10 +3791,10 @@
         </p:sp>
         <p:sp>
           <p:nvSpPr>
-            <p:cNvPr id="11" name="Oval 10">
+            <p:cNvPr id="9" name="Oval 8">
               <a:extLst>
                 <a:ext uri="{FF2B5EF4-FFF2-40B4-BE49-F238E27FC236}">
-                  <a16:creationId xmlns:a16="http://schemas.microsoft.com/office/drawing/2014/main" id="{679EC4AF-2929-5B99-5EF7-E5FA5FEAF9E6}"/>
+                  <a16:creationId xmlns:a16="http://schemas.microsoft.com/office/drawing/2014/main" id="{F30ADE69-3BD4-E5CD-D99B-324A40E383DF}"/>
                 </a:ext>
               </a:extLst>
             </p:cNvPr>
@@ -3770,7 +3803,7 @@
           </p:nvSpPr>
           <p:spPr>
             <a:xfrm>
-              <a:off x="2898144" y="1109819"/>
+              <a:off x="3131392" y="3771440"/>
               <a:ext cx="273378" cy="273378"/>
             </a:xfrm>
             <a:prstGeom prst="ellipse">
@@ -3801,307 +3834,321 @@
                   <a:latin typeface="Segoe UI" panose="020B0502040204020203" pitchFamily="34" charset="0"/>
                   <a:cs typeface="Segoe UI" panose="020B0502040204020203" pitchFamily="34" charset="0"/>
                 </a:rPr>
+                <a:t>9</a:t>
+              </a:r>
+            </a:p>
+          </p:txBody>
+        </p:sp>
+        <p:sp>
+          <p:nvSpPr>
+            <p:cNvPr id="11" name="Oval 10">
+              <a:extLst>
+                <a:ext uri="{FF2B5EF4-FFF2-40B4-BE49-F238E27FC236}">
+                  <a16:creationId xmlns:a16="http://schemas.microsoft.com/office/drawing/2014/main" id="{679EC4AF-2929-5B99-5EF7-E5FA5FEAF9E6}"/>
+                </a:ext>
+              </a:extLst>
+            </p:cNvPr>
+            <p:cNvSpPr/>
+            <p:nvPr/>
+          </p:nvSpPr>
+          <p:spPr>
+            <a:xfrm>
+              <a:off x="2643620" y="1468037"/>
+              <a:ext cx="273378" cy="273378"/>
+            </a:xfrm>
+            <a:prstGeom prst="ellipse">
+              <a:avLst/>
+            </a:prstGeom>
+          </p:spPr>
+          <p:style>
+            <a:lnRef idx="0">
+              <a:schemeClr val="accent5"/>
+            </a:lnRef>
+            <a:fillRef idx="3">
+              <a:schemeClr val="accent5"/>
+            </a:fillRef>
+            <a:effectRef idx="3">
+              <a:schemeClr val="accent5"/>
+            </a:effectRef>
+            <a:fontRef idx="minor">
+              <a:schemeClr val="lt1"/>
+            </a:fontRef>
+          </p:style>
+          <p:txBody>
+            <a:bodyPr rtlCol="0" anchor="ctr"/>
+            <a:lstStyle/>
+            <a:p>
+              <a:pPr algn="ctr"/>
+              <a:r>
+                <a:rPr lang="en-US" dirty="0">
+                  <a:latin typeface="Segoe UI" panose="020B0502040204020203" pitchFamily="34" charset="0"/>
+                  <a:cs typeface="Segoe UI" panose="020B0502040204020203" pitchFamily="34" charset="0"/>
+                </a:rPr>
+                <a:t>8</a:t>
+              </a:r>
+            </a:p>
+          </p:txBody>
+        </p:sp>
+        <p:sp>
+          <p:nvSpPr>
+            <p:cNvPr id="14" name="Oval 13">
+              <a:extLst>
+                <a:ext uri="{FF2B5EF4-FFF2-40B4-BE49-F238E27FC236}">
+                  <a16:creationId xmlns:a16="http://schemas.microsoft.com/office/drawing/2014/main" id="{8681380F-6D93-2B68-1D45-531010C98315}"/>
+                </a:ext>
+              </a:extLst>
+            </p:cNvPr>
+            <p:cNvSpPr/>
+            <p:nvPr/>
+          </p:nvSpPr>
+          <p:spPr>
+            <a:xfrm>
+              <a:off x="1780190" y="4554457"/>
+              <a:ext cx="182880" cy="182880"/>
+            </a:xfrm>
+            <a:prstGeom prst="ellipse">
+              <a:avLst/>
+            </a:prstGeom>
+            <a:solidFill>
+              <a:srgbClr val="7030A0"/>
+            </a:solidFill>
+          </p:spPr>
+          <p:style>
+            <a:lnRef idx="0">
+              <a:schemeClr val="accent6"/>
+            </a:lnRef>
+            <a:fillRef idx="3">
+              <a:schemeClr val="accent6"/>
+            </a:fillRef>
+            <a:effectRef idx="3">
+              <a:schemeClr val="accent6"/>
+            </a:effectRef>
+            <a:fontRef idx="minor">
+              <a:schemeClr val="lt1"/>
+            </a:fontRef>
+          </p:style>
+          <p:txBody>
+            <a:bodyPr rtlCol="0" anchor="ctr"/>
+            <a:lstStyle/>
+            <a:p>
+              <a:pPr algn="ctr"/>
+              <a:r>
+                <a:rPr lang="en-US" sz="1200" dirty="0">
+                  <a:latin typeface="Segoe UI" panose="020B0502040204020203" pitchFamily="34" charset="0"/>
+                  <a:cs typeface="Segoe UI" panose="020B0502040204020203" pitchFamily="34" charset="0"/>
+                </a:rPr>
+                <a:t>a</a:t>
+              </a:r>
+            </a:p>
+          </p:txBody>
+        </p:sp>
+        <p:sp>
+          <p:nvSpPr>
+            <p:cNvPr id="17" name="Oval 16">
+              <a:extLst>
+                <a:ext uri="{FF2B5EF4-FFF2-40B4-BE49-F238E27FC236}">
+                  <a16:creationId xmlns:a16="http://schemas.microsoft.com/office/drawing/2014/main" id="{626CAD21-FC97-1B25-F390-2B6076E1205A}"/>
+                </a:ext>
+              </a:extLst>
+            </p:cNvPr>
+            <p:cNvSpPr/>
+            <p:nvPr/>
+          </p:nvSpPr>
+          <p:spPr>
+            <a:xfrm>
+              <a:off x="2431251" y="4351660"/>
+              <a:ext cx="182880" cy="182880"/>
+            </a:xfrm>
+            <a:prstGeom prst="ellipse">
+              <a:avLst/>
+            </a:prstGeom>
+            <a:solidFill>
+              <a:srgbClr val="7030A0"/>
+            </a:solidFill>
+          </p:spPr>
+          <p:style>
+            <a:lnRef idx="0">
+              <a:schemeClr val="accent6"/>
+            </a:lnRef>
+            <a:fillRef idx="3">
+              <a:schemeClr val="accent6"/>
+            </a:fillRef>
+            <a:effectRef idx="3">
+              <a:schemeClr val="accent6"/>
+            </a:effectRef>
+            <a:fontRef idx="minor">
+              <a:schemeClr val="lt1"/>
+            </a:fontRef>
+          </p:style>
+          <p:txBody>
+            <a:bodyPr rtlCol="0" anchor="ctr"/>
+            <a:lstStyle/>
+            <a:p>
+              <a:pPr algn="ctr"/>
+              <a:r>
+                <a:rPr lang="en-US" sz="1200" dirty="0">
+                  <a:latin typeface="Segoe UI" panose="020B0502040204020203" pitchFamily="34" charset="0"/>
+                  <a:cs typeface="Segoe UI" panose="020B0502040204020203" pitchFamily="34" charset="0"/>
+                </a:rPr>
+                <a:t>b</a:t>
+              </a:r>
+            </a:p>
+          </p:txBody>
+        </p:sp>
+        <p:sp>
+          <p:nvSpPr>
+            <p:cNvPr id="12" name="Oval 11">
+              <a:extLst>
+                <a:ext uri="{FF2B5EF4-FFF2-40B4-BE49-F238E27FC236}">
+                  <a16:creationId xmlns:a16="http://schemas.microsoft.com/office/drawing/2014/main" id="{7FC91A1D-BD46-A3B4-D99F-AF6DEB565DC4}"/>
+                </a:ext>
+              </a:extLst>
+            </p:cNvPr>
+            <p:cNvSpPr/>
+            <p:nvPr/>
+          </p:nvSpPr>
+          <p:spPr>
+            <a:xfrm>
+              <a:off x="507103" y="1671680"/>
+              <a:ext cx="273378" cy="273378"/>
+            </a:xfrm>
+            <a:prstGeom prst="ellipse">
+              <a:avLst/>
+            </a:prstGeom>
+          </p:spPr>
+          <p:style>
+            <a:lnRef idx="0">
+              <a:schemeClr val="accent2"/>
+            </a:lnRef>
+            <a:fillRef idx="3">
+              <a:schemeClr val="accent2"/>
+            </a:fillRef>
+            <a:effectRef idx="3">
+              <a:schemeClr val="accent2"/>
+            </a:effectRef>
+            <a:fontRef idx="minor">
+              <a:schemeClr val="lt1"/>
+            </a:fontRef>
+          </p:style>
+          <p:txBody>
+            <a:bodyPr rtlCol="0" anchor="ctr"/>
+            <a:lstStyle/>
+            <a:p>
+              <a:pPr algn="ctr"/>
+              <a:r>
+                <a:rPr lang="en-US" dirty="0">
+                  <a:latin typeface="Segoe UI" panose="020B0502040204020203" pitchFamily="34" charset="0"/>
+                  <a:cs typeface="Segoe UI" panose="020B0502040204020203" pitchFamily="34" charset="0"/>
+                </a:rPr>
+                <a:t>5</a:t>
+              </a:r>
+            </a:p>
+          </p:txBody>
+        </p:sp>
+        <p:sp>
+          <p:nvSpPr>
+            <p:cNvPr id="13" name="Oval 12">
+              <a:extLst>
+                <a:ext uri="{FF2B5EF4-FFF2-40B4-BE49-F238E27FC236}">
+                  <a16:creationId xmlns:a16="http://schemas.microsoft.com/office/drawing/2014/main" id="{4A41FAEF-991E-32AF-099A-FCBFB624B3D1}"/>
+                </a:ext>
+              </a:extLst>
+            </p:cNvPr>
+            <p:cNvSpPr/>
+            <p:nvPr/>
+          </p:nvSpPr>
+          <p:spPr>
+            <a:xfrm>
+              <a:off x="2745897" y="3149300"/>
+              <a:ext cx="273378" cy="273378"/>
+            </a:xfrm>
+            <a:prstGeom prst="ellipse">
+              <a:avLst/>
+            </a:prstGeom>
+          </p:spPr>
+          <p:style>
+            <a:lnRef idx="0">
+              <a:schemeClr val="accent2"/>
+            </a:lnRef>
+            <a:fillRef idx="3">
+              <a:schemeClr val="accent2"/>
+            </a:fillRef>
+            <a:effectRef idx="3">
+              <a:schemeClr val="accent2"/>
+            </a:effectRef>
+            <a:fontRef idx="minor">
+              <a:schemeClr val="lt1"/>
+            </a:fontRef>
+          </p:style>
+          <p:txBody>
+            <a:bodyPr rtlCol="0" anchor="ctr"/>
+            <a:lstStyle/>
+            <a:p>
+              <a:pPr algn="ctr"/>
+              <a:r>
+                <a:rPr lang="en-US" dirty="0">
+                  <a:latin typeface="Segoe UI" panose="020B0502040204020203" pitchFamily="34" charset="0"/>
+                  <a:cs typeface="Segoe UI" panose="020B0502040204020203" pitchFamily="34" charset="0"/>
+                </a:rPr>
                 <a:t>6</a:t>
               </a:r>
             </a:p>
           </p:txBody>
         </p:sp>
+        <p:sp>
+          <p:nvSpPr>
+            <p:cNvPr id="20" name="Oval 19">
+              <a:extLst>
+                <a:ext uri="{FF2B5EF4-FFF2-40B4-BE49-F238E27FC236}">
+                  <a16:creationId xmlns:a16="http://schemas.microsoft.com/office/drawing/2014/main" id="{4BAF572D-F7F9-CEE6-C9FD-AF4702035AB6}"/>
+                </a:ext>
+              </a:extLst>
+            </p:cNvPr>
+            <p:cNvSpPr/>
+            <p:nvPr/>
+          </p:nvSpPr>
+          <p:spPr>
+            <a:xfrm>
+              <a:off x="2240436" y="4091428"/>
+              <a:ext cx="182880" cy="182880"/>
+            </a:xfrm>
+            <a:prstGeom prst="ellipse">
+              <a:avLst/>
+            </a:prstGeom>
+            <a:solidFill>
+              <a:srgbClr val="7030A0"/>
+            </a:solidFill>
+          </p:spPr>
+          <p:style>
+            <a:lnRef idx="0">
+              <a:schemeClr val="accent6"/>
+            </a:lnRef>
+            <a:fillRef idx="3">
+              <a:schemeClr val="accent6"/>
+            </a:fillRef>
+            <a:effectRef idx="3">
+              <a:schemeClr val="accent6"/>
+            </a:effectRef>
+            <a:fontRef idx="minor">
+              <a:schemeClr val="lt1"/>
+            </a:fontRef>
+          </p:style>
+          <p:txBody>
+            <a:bodyPr rtlCol="0" anchor="ctr"/>
+            <a:lstStyle/>
+            <a:p>
+              <a:pPr algn="ctr"/>
+              <a:r>
+                <a:rPr lang="en-US" sz="1200" dirty="0">
+                  <a:latin typeface="Segoe UI" panose="020B0502040204020203" pitchFamily="34" charset="0"/>
+                  <a:cs typeface="Segoe UI" panose="020B0502040204020203" pitchFamily="34" charset="0"/>
+                </a:rPr>
+                <a:t>c</a:t>
+              </a:r>
+            </a:p>
+          </p:txBody>
+        </p:sp>
       </p:grpSp>
-      <p:sp>
-        <p:nvSpPr>
-          <p:cNvPr id="15" name="TextBox 14">
-            <a:extLst>
-              <a:ext uri="{FF2B5EF4-FFF2-40B4-BE49-F238E27FC236}">
-                <a16:creationId xmlns:a16="http://schemas.microsoft.com/office/drawing/2014/main" id="{4C379592-850C-C72D-59A2-83433A057A62}"/>
-              </a:ext>
-            </a:extLst>
-          </p:cNvPr>
-          <p:cNvSpPr txBox="1"/>
-          <p:nvPr/>
-        </p:nvSpPr>
-        <p:spPr>
-          <a:xfrm>
-            <a:off x="0" y="79597"/>
-            <a:ext cx="12192000" cy="400110"/>
-          </a:xfrm>
-          <a:prstGeom prst="rect">
-            <a:avLst/>
-          </a:prstGeom>
-          <a:solidFill>
-            <a:schemeClr val="accent1"/>
-          </a:solidFill>
-        </p:spPr>
-        <p:txBody>
-          <a:bodyPr wrap="square" rtlCol="0">
-            <a:spAutoFit/>
-          </a:bodyPr>
-          <a:lstStyle/>
-          <a:p>
-            <a:r>
-              <a:rPr lang="en-US" sz="2000" b="1" dirty="0">
-                <a:solidFill>
-                  <a:schemeClr val="bg1"/>
-                </a:solidFill>
-              </a:rPr>
-              <a:t>Popup Instructions</a:t>
-            </a:r>
-          </a:p>
-        </p:txBody>
-      </p:sp>
-      <p:sp>
-        <p:nvSpPr>
-          <p:cNvPr id="16" name="TextBox 15">
-            <a:extLst>
-              <a:ext uri="{FF2B5EF4-FFF2-40B4-BE49-F238E27FC236}">
-                <a16:creationId xmlns:a16="http://schemas.microsoft.com/office/drawing/2014/main" id="{CEEDB5F6-0F70-8461-9860-3B5E730415DD}"/>
-              </a:ext>
-            </a:extLst>
-          </p:cNvPr>
-          <p:cNvSpPr txBox="1"/>
-          <p:nvPr/>
-        </p:nvSpPr>
-        <p:spPr>
-          <a:xfrm>
-            <a:off x="-21258" y="444558"/>
-            <a:ext cx="4250010" cy="276999"/>
-          </a:xfrm>
-          <a:prstGeom prst="rect">
-            <a:avLst/>
-          </a:prstGeom>
-          <a:noFill/>
-        </p:spPr>
-        <p:txBody>
-          <a:bodyPr wrap="none" rtlCol="0">
-            <a:spAutoFit/>
-          </a:bodyPr>
-          <a:lstStyle/>
-          <a:p>
-            <a:r>
-              <a:rPr lang="en-US" sz="1200" dirty="0"/>
-              <a:t>Reference Link: </a:t>
-            </a:r>
-            <a:r>
-              <a:rPr lang="en-US" sz="1200" dirty="0">
-                <a:hlinkClick r:id="rId3"/>
-              </a:rPr>
-              <a:t>https://stackoverflow.com/q/73591695/6908282</a:t>
-            </a:r>
-            <a:endParaRPr lang="en-US" sz="1200" dirty="0"/>
-          </a:p>
-        </p:txBody>
-      </p:sp>
-      <p:sp>
-        <p:nvSpPr>
-          <p:cNvPr id="14" name="Oval 13">
-            <a:extLst>
-              <a:ext uri="{FF2B5EF4-FFF2-40B4-BE49-F238E27FC236}">
-                <a16:creationId xmlns:a16="http://schemas.microsoft.com/office/drawing/2014/main" id="{8681380F-6D93-2B68-1D45-531010C98315}"/>
-              </a:ext>
-            </a:extLst>
-          </p:cNvPr>
-          <p:cNvSpPr/>
-          <p:nvPr/>
-        </p:nvSpPr>
-        <p:spPr>
-          <a:xfrm>
-            <a:off x="562564" y="1666430"/>
-            <a:ext cx="182880" cy="182880"/>
-          </a:xfrm>
-          <a:prstGeom prst="ellipse">
-            <a:avLst/>
-          </a:prstGeom>
-          <a:solidFill>
-            <a:srgbClr val="7030A0"/>
-          </a:solidFill>
-        </p:spPr>
-        <p:style>
-          <a:lnRef idx="0">
-            <a:schemeClr val="accent6"/>
-          </a:lnRef>
-          <a:fillRef idx="3">
-            <a:schemeClr val="accent6"/>
-          </a:fillRef>
-          <a:effectRef idx="3">
-            <a:schemeClr val="accent6"/>
-          </a:effectRef>
-          <a:fontRef idx="minor">
-            <a:schemeClr val="lt1"/>
-          </a:fontRef>
-        </p:style>
-        <p:txBody>
-          <a:bodyPr rtlCol="0" anchor="ctr"/>
-          <a:lstStyle/>
-          <a:p>
-            <a:pPr algn="ctr"/>
-            <a:r>
-              <a:rPr lang="en-US" sz="1200" dirty="0">
-                <a:latin typeface="Segoe UI" panose="020B0502040204020203" pitchFamily="34" charset="0"/>
-                <a:cs typeface="Segoe UI" panose="020B0502040204020203" pitchFamily="34" charset="0"/>
-              </a:rPr>
-              <a:t>a</a:t>
-            </a:r>
-          </a:p>
-        </p:txBody>
-      </p:sp>
-      <p:sp>
-        <p:nvSpPr>
-          <p:cNvPr id="17" name="Oval 16">
-            <a:extLst>
-              <a:ext uri="{FF2B5EF4-FFF2-40B4-BE49-F238E27FC236}">
-                <a16:creationId xmlns:a16="http://schemas.microsoft.com/office/drawing/2014/main" id="{626CAD21-FC97-1B25-F390-2B6076E1205A}"/>
-              </a:ext>
-            </a:extLst>
-          </p:cNvPr>
-          <p:cNvSpPr/>
-          <p:nvPr/>
-        </p:nvSpPr>
-        <p:spPr>
-          <a:xfrm>
-            <a:off x="2825558" y="3124231"/>
-            <a:ext cx="182880" cy="182880"/>
-          </a:xfrm>
-          <a:prstGeom prst="ellipse">
-            <a:avLst/>
-          </a:prstGeom>
-          <a:solidFill>
-            <a:srgbClr val="7030A0"/>
-          </a:solidFill>
-        </p:spPr>
-        <p:style>
-          <a:lnRef idx="0">
-            <a:schemeClr val="accent6"/>
-          </a:lnRef>
-          <a:fillRef idx="3">
-            <a:schemeClr val="accent6"/>
-          </a:fillRef>
-          <a:effectRef idx="3">
-            <a:schemeClr val="accent6"/>
-          </a:effectRef>
-          <a:fontRef idx="minor">
-            <a:schemeClr val="lt1"/>
-          </a:fontRef>
-        </p:style>
-        <p:txBody>
-          <a:bodyPr rtlCol="0" anchor="ctr"/>
-          <a:lstStyle/>
-          <a:p>
-            <a:pPr algn="ctr"/>
-            <a:r>
-              <a:rPr lang="en-US" sz="1200" dirty="0">
-                <a:latin typeface="Segoe UI" panose="020B0502040204020203" pitchFamily="34" charset="0"/>
-                <a:cs typeface="Segoe UI" panose="020B0502040204020203" pitchFamily="34" charset="0"/>
-              </a:rPr>
-              <a:t>b</a:t>
-            </a:r>
-          </a:p>
-        </p:txBody>
-      </p:sp>
-      <p:sp>
-        <p:nvSpPr>
-          <p:cNvPr id="18" name="Oval 17">
-            <a:extLst>
-              <a:ext uri="{FF2B5EF4-FFF2-40B4-BE49-F238E27FC236}">
-                <a16:creationId xmlns:a16="http://schemas.microsoft.com/office/drawing/2014/main" id="{DC33F988-8180-DEF2-6E14-743F6549B91F}"/>
-              </a:ext>
-            </a:extLst>
-          </p:cNvPr>
-          <p:cNvSpPr/>
-          <p:nvPr/>
-        </p:nvSpPr>
-        <p:spPr>
-          <a:xfrm>
-            <a:off x="2226136" y="4050199"/>
-            <a:ext cx="182880" cy="182880"/>
-          </a:xfrm>
-          <a:prstGeom prst="ellipse">
-            <a:avLst/>
-          </a:prstGeom>
-          <a:solidFill>
-            <a:srgbClr val="7030A0"/>
-          </a:solidFill>
-        </p:spPr>
-        <p:style>
-          <a:lnRef idx="0">
-            <a:schemeClr val="accent6"/>
-          </a:lnRef>
-          <a:fillRef idx="3">
-            <a:schemeClr val="accent6"/>
-          </a:fillRef>
-          <a:effectRef idx="3">
-            <a:schemeClr val="accent6"/>
-          </a:effectRef>
-          <a:fontRef idx="minor">
-            <a:schemeClr val="lt1"/>
-          </a:fontRef>
-        </p:style>
-        <p:txBody>
-          <a:bodyPr rtlCol="0" anchor="ctr"/>
-          <a:lstStyle/>
-          <a:p>
-            <a:pPr algn="ctr"/>
-            <a:r>
-              <a:rPr lang="en-US" sz="1200" dirty="0">
-                <a:latin typeface="Segoe UI" panose="020B0502040204020203" pitchFamily="34" charset="0"/>
-                <a:cs typeface="Segoe UI" panose="020B0502040204020203" pitchFamily="34" charset="0"/>
-              </a:rPr>
-              <a:t>c</a:t>
-            </a:r>
-          </a:p>
-        </p:txBody>
-      </p:sp>
-      <p:sp>
-        <p:nvSpPr>
-          <p:cNvPr id="19" name="Oval 18">
-            <a:extLst>
-              <a:ext uri="{FF2B5EF4-FFF2-40B4-BE49-F238E27FC236}">
-                <a16:creationId xmlns:a16="http://schemas.microsoft.com/office/drawing/2014/main" id="{675D5C87-244A-8ABD-890F-C89475C24C76}"/>
-              </a:ext>
-            </a:extLst>
-          </p:cNvPr>
-          <p:cNvSpPr/>
-          <p:nvPr/>
-        </p:nvSpPr>
-        <p:spPr>
-          <a:xfrm>
-            <a:off x="2431251" y="4369205"/>
-            <a:ext cx="182880" cy="182880"/>
-          </a:xfrm>
-          <a:prstGeom prst="ellipse">
-            <a:avLst/>
-          </a:prstGeom>
-          <a:solidFill>
-            <a:srgbClr val="7030A0"/>
-          </a:solidFill>
-        </p:spPr>
-        <p:style>
-          <a:lnRef idx="0">
-            <a:schemeClr val="accent6"/>
-          </a:lnRef>
-          <a:fillRef idx="3">
-            <a:schemeClr val="accent6"/>
-          </a:fillRef>
-          <a:effectRef idx="3">
-            <a:schemeClr val="accent6"/>
-          </a:effectRef>
-          <a:fontRef idx="minor">
-            <a:schemeClr val="lt1"/>
-          </a:fontRef>
-        </p:style>
-        <p:txBody>
-          <a:bodyPr rtlCol="0" anchor="ctr"/>
-          <a:lstStyle/>
-          <a:p>
-            <a:pPr algn="ctr"/>
-            <a:r>
-              <a:rPr lang="en-US" sz="1200" dirty="0">
-                <a:latin typeface="Segoe UI" panose="020B0502040204020203" pitchFamily="34" charset="0"/>
-                <a:cs typeface="Segoe UI" panose="020B0502040204020203" pitchFamily="34" charset="0"/>
-              </a:rPr>
-              <a:t>d</a:t>
-            </a:r>
-          </a:p>
-        </p:txBody>
-      </p:sp>
     </p:spTree>
     <p:extLst>
       <p:ext uri="{BB962C8B-B14F-4D97-AF65-F5344CB8AC3E}">
@@ -4323,10 +4370,10 @@
       </p:pic>
       <p:pic>
         <p:nvPicPr>
-          <p:cNvPr id="10" name="Picture 9">
-            <a:extLst>
-              <a:ext uri="{FF2B5EF4-FFF2-40B4-BE49-F238E27FC236}">
-                <a16:creationId xmlns:a16="http://schemas.microsoft.com/office/drawing/2014/main" id="{349703C9-4F81-7CB7-396B-3883184BED8B}"/>
+          <p:cNvPr id="5" name="Picture 4">
+            <a:extLst>
+              <a:ext uri="{FF2B5EF4-FFF2-40B4-BE49-F238E27FC236}">
+                <a16:creationId xmlns:a16="http://schemas.microsoft.com/office/drawing/2014/main" id="{0EF67ED7-32C7-E38D-2CAB-F213DF14E266}"/>
               </a:ext>
             </a:extLst>
           </p:cNvPr>
@@ -4336,32 +4383,19 @@
           <p:nvPr/>
         </p:nvPicPr>
         <p:blipFill>
-          <a:blip r:embed="rId7">
-            <a:extLst>
-              <a:ext uri="{28A0092B-C50C-407E-A947-70E740481C1C}">
-                <a14:useLocalDpi xmlns:a14="http://schemas.microsoft.com/office/drawing/2010/main" val="0"/>
-              </a:ext>
-            </a:extLst>
-          </a:blip>
-          <a:srcRect/>
-          <a:stretch/>
+          <a:blip r:embed="rId7"/>
+          <a:stretch>
+            <a:fillRect/>
+          </a:stretch>
         </p:blipFill>
         <p:spPr>
           <a:xfrm>
-            <a:off x="2703516" y="1285064"/>
-            <a:ext cx="4086507" cy="5128378"/>
+            <a:off x="2859697" y="1569035"/>
+            <a:ext cx="3842500" cy="4724221"/>
           </a:xfrm>
           <a:prstGeom prst="rect">
             <a:avLst/>
           </a:prstGeom>
-          <a:ln>
-            <a:solidFill>
-              <a:schemeClr val="tx1">
-                <a:lumMod val="50000"/>
-                <a:lumOff val="50000"/>
-              </a:schemeClr>
-            </a:solidFill>
-          </a:ln>
         </p:spPr>
       </p:pic>
     </p:spTree>
@@ -4642,7 +4676,7 @@
         </p:blipFill>
         <p:spPr>
           <a:xfrm>
-            <a:off x="4837920" y="801084"/>
+            <a:off x="2325539" y="1600075"/>
             <a:ext cx="5460178" cy="4430205"/>
           </a:xfrm>
           <a:prstGeom prst="rect">
@@ -4942,8 +4976,8 @@
         </p:blipFill>
         <p:spPr>
           <a:xfrm>
-            <a:off x="390319" y="3263788"/>
-            <a:ext cx="6212457" cy="3322819"/>
+            <a:off x="292628" y="2071632"/>
+            <a:ext cx="8274324" cy="4425637"/>
           </a:xfrm>
           <a:prstGeom prst="rect">
             <a:avLst/>

</xml_diff>